<commit_message>
added pyspark sql labs
</commit_message>
<xml_diff>
--- a/Slides/Apache Spark/Apache Spark Overview.pptx
+++ b/Slides/Apache Spark/Apache Spark Overview.pptx
@@ -291,7 +291,7 @@
           <a:p>
             <a:fld id="{883415E9-2DA8-411B-9C71-CF65A2512DF2}" type="datetimeFigureOut">
               <a:rPr lang="en-IN" smtClean="0"/>
-              <a:t>02-02-2023</a:t>
+              <a:t>27-02-2023</a:t>
             </a:fld>
             <a:endParaRPr lang="en-IN"/>
           </a:p>
@@ -491,7 +491,7 @@
           <a:p>
             <a:fld id="{883415E9-2DA8-411B-9C71-CF65A2512DF2}" type="datetimeFigureOut">
               <a:rPr lang="en-IN" smtClean="0"/>
-              <a:t>02-02-2023</a:t>
+              <a:t>27-02-2023</a:t>
             </a:fld>
             <a:endParaRPr lang="en-IN"/>
           </a:p>
@@ -701,7 +701,7 @@
           <a:p>
             <a:fld id="{883415E9-2DA8-411B-9C71-CF65A2512DF2}" type="datetimeFigureOut">
               <a:rPr lang="en-IN" smtClean="0"/>
-              <a:t>02-02-2023</a:t>
+              <a:t>27-02-2023</a:t>
             </a:fld>
             <a:endParaRPr lang="en-IN"/>
           </a:p>
@@ -901,7 +901,7 @@
           <a:p>
             <a:fld id="{883415E9-2DA8-411B-9C71-CF65A2512DF2}" type="datetimeFigureOut">
               <a:rPr lang="en-IN" smtClean="0"/>
-              <a:t>02-02-2023</a:t>
+              <a:t>27-02-2023</a:t>
             </a:fld>
             <a:endParaRPr lang="en-IN"/>
           </a:p>
@@ -1177,7 +1177,7 @@
           <a:p>
             <a:fld id="{883415E9-2DA8-411B-9C71-CF65A2512DF2}" type="datetimeFigureOut">
               <a:rPr lang="en-IN" smtClean="0"/>
-              <a:t>02-02-2023</a:t>
+              <a:t>27-02-2023</a:t>
             </a:fld>
             <a:endParaRPr lang="en-IN"/>
           </a:p>
@@ -1445,7 +1445,7 @@
           <a:p>
             <a:fld id="{883415E9-2DA8-411B-9C71-CF65A2512DF2}" type="datetimeFigureOut">
               <a:rPr lang="en-IN" smtClean="0"/>
-              <a:t>02-02-2023</a:t>
+              <a:t>27-02-2023</a:t>
             </a:fld>
             <a:endParaRPr lang="en-IN"/>
           </a:p>
@@ -1860,7 +1860,7 @@
           <a:p>
             <a:fld id="{883415E9-2DA8-411B-9C71-CF65A2512DF2}" type="datetimeFigureOut">
               <a:rPr lang="en-IN" smtClean="0"/>
-              <a:t>02-02-2023</a:t>
+              <a:t>27-02-2023</a:t>
             </a:fld>
             <a:endParaRPr lang="en-IN"/>
           </a:p>
@@ -2002,7 +2002,7 @@
           <a:p>
             <a:fld id="{883415E9-2DA8-411B-9C71-CF65A2512DF2}" type="datetimeFigureOut">
               <a:rPr lang="en-IN" smtClean="0"/>
-              <a:t>02-02-2023</a:t>
+              <a:t>27-02-2023</a:t>
             </a:fld>
             <a:endParaRPr lang="en-IN"/>
           </a:p>
@@ -2115,7 +2115,7 @@
           <a:p>
             <a:fld id="{883415E9-2DA8-411B-9C71-CF65A2512DF2}" type="datetimeFigureOut">
               <a:rPr lang="en-IN" smtClean="0"/>
-              <a:t>02-02-2023</a:t>
+              <a:t>27-02-2023</a:t>
             </a:fld>
             <a:endParaRPr lang="en-IN"/>
           </a:p>
@@ -2428,7 +2428,7 @@
           <a:p>
             <a:fld id="{883415E9-2DA8-411B-9C71-CF65A2512DF2}" type="datetimeFigureOut">
               <a:rPr lang="en-IN" smtClean="0"/>
-              <a:t>02-02-2023</a:t>
+              <a:t>27-02-2023</a:t>
             </a:fld>
             <a:endParaRPr lang="en-IN"/>
           </a:p>
@@ -2717,7 +2717,7 @@
           <a:p>
             <a:fld id="{883415E9-2DA8-411B-9C71-CF65A2512DF2}" type="datetimeFigureOut">
               <a:rPr lang="en-IN" smtClean="0"/>
-              <a:t>02-02-2023</a:t>
+              <a:t>27-02-2023</a:t>
             </a:fld>
             <a:endParaRPr lang="en-IN"/>
           </a:p>
@@ -2960,7 +2960,7 @@
           <a:p>
             <a:fld id="{883415E9-2DA8-411B-9C71-CF65A2512DF2}" type="datetimeFigureOut">
               <a:rPr lang="en-IN" smtClean="0"/>
-              <a:t>02-02-2023</a:t>
+              <a:t>27-02-2023</a:t>
             </a:fld>
             <a:endParaRPr lang="en-IN"/>
           </a:p>

</xml_diff>